<commit_message>
fautes dans la présentation corrigées
</commit_message>
<xml_diff>
--- a/Projet OMP.pptx
+++ b/Projet OMP.pptx
@@ -151,7 +151,7 @@
   </p:defaultTextStyle>
   <p:extLst>
     <p:ext uri="{EFAFB233-063F-42B5-8137-9DF3F51BA10A}">
-      <p15:sldGuideLst xmlns:p15="http://schemas.microsoft.com/office/powerpoint/2012/main">
+      <p15:sldGuideLst xmlns="" xmlns:p15="http://schemas.microsoft.com/office/powerpoint/2012/main">
         <p15:guide id="1" orient="horz" pos="2160">
           <p15:clr>
             <a:srgbClr val="A4A3A4"/>
@@ -217,14 +217,14 @@
           </a:ln>
           <a:effectLst/>
           <a:extLst>
-            <a:ext uri="{909E8E84-426E-40DD-AFC4-6F175D3DCCD1}">
+            <a:ext uri="{909E8E84-426E-40dd-AFC4-6F175D3DCCD1}">
               <a14:hiddenFill xmlns:a14="http://schemas.microsoft.com/office/drawing/2010/main">
                 <a:solidFill>
                   <a:schemeClr val="accent1"/>
                 </a:solidFill>
               </a14:hiddenFill>
             </a:ext>
-            <a:ext uri="{91240B29-F687-4F45-9708-019B960494DF}">
+            <a:ext uri="{91240B29-F687-4f45-9708-019B960494DF}">
               <a14:hiddenLine xmlns:a14="http://schemas.microsoft.com/office/drawing/2010/main" w="12700" cap="sq">
                 <a:solidFill>
                   <a:schemeClr val="tx1"/>
@@ -234,7 +234,7 @@
                 <a:tailEnd type="none" w="sm" len="sm"/>
               </a14:hiddenLine>
             </a:ext>
-            <a:ext uri="{AF507438-7753-43E0-B8FC-AC1667EBCBE1}">
+            <a:ext uri="{AF507438-7753-43e0-B8FC-AC1667EBCBE1}">
               <a14:hiddenEffects xmlns:a14="http://schemas.microsoft.com/office/drawing/2010/main">
                 <a:effectLst>
                   <a:outerShdw dist="35921" dir="2700000" algn="ctr" rotWithShape="0">
@@ -285,14 +285,14 @@
           </a:ln>
           <a:effectLst/>
           <a:extLst>
-            <a:ext uri="{909E8E84-426E-40DD-AFC4-6F175D3DCCD1}">
+            <a:ext uri="{909E8E84-426E-40dd-AFC4-6F175D3DCCD1}">
               <a14:hiddenFill xmlns:a14="http://schemas.microsoft.com/office/drawing/2010/main">
                 <a:solidFill>
                   <a:schemeClr val="accent1"/>
                 </a:solidFill>
               </a14:hiddenFill>
             </a:ext>
-            <a:ext uri="{91240B29-F687-4F45-9708-019B960494DF}">
+            <a:ext uri="{91240B29-F687-4f45-9708-019B960494DF}">
               <a14:hiddenLine xmlns:a14="http://schemas.microsoft.com/office/drawing/2010/main" w="12700" cap="sq">
                 <a:solidFill>
                   <a:schemeClr val="tx1"/>
@@ -302,7 +302,7 @@
                 <a:tailEnd type="none" w="sm" len="sm"/>
               </a14:hiddenLine>
             </a:ext>
-            <a:ext uri="{AF507438-7753-43E0-B8FC-AC1667EBCBE1}">
+            <a:ext uri="{AF507438-7753-43e0-B8FC-AC1667EBCBE1}">
               <a14:hiddenEffects xmlns:a14="http://schemas.microsoft.com/office/drawing/2010/main">
                 <a:effectLst>
                   <a:outerShdw dist="35921" dir="2700000" algn="ctr" rotWithShape="0">
@@ -353,14 +353,14 @@
           </a:ln>
           <a:effectLst/>
           <a:extLst>
-            <a:ext uri="{909E8E84-426E-40DD-AFC4-6F175D3DCCD1}">
+            <a:ext uri="{909E8E84-426E-40dd-AFC4-6F175D3DCCD1}">
               <a14:hiddenFill xmlns:a14="http://schemas.microsoft.com/office/drawing/2010/main">
                 <a:solidFill>
                   <a:schemeClr val="accent1"/>
                 </a:solidFill>
               </a14:hiddenFill>
             </a:ext>
-            <a:ext uri="{91240B29-F687-4F45-9708-019B960494DF}">
+            <a:ext uri="{91240B29-F687-4f45-9708-019B960494DF}">
               <a14:hiddenLine xmlns:a14="http://schemas.microsoft.com/office/drawing/2010/main" w="12700" cap="sq">
                 <a:solidFill>
                   <a:schemeClr val="tx1"/>
@@ -370,7 +370,7 @@
                 <a:tailEnd type="none" w="sm" len="sm"/>
               </a14:hiddenLine>
             </a:ext>
-            <a:ext uri="{AF507438-7753-43E0-B8FC-AC1667EBCBE1}">
+            <a:ext uri="{AF507438-7753-43e0-B8FC-AC1667EBCBE1}">
               <a14:hiddenEffects xmlns:a14="http://schemas.microsoft.com/office/drawing/2010/main">
                 <a:effectLst>
                   <a:outerShdw dist="35921" dir="2700000" algn="ctr" rotWithShape="0">
@@ -421,14 +421,14 @@
           </a:ln>
           <a:effectLst/>
           <a:extLst>
-            <a:ext uri="{909E8E84-426E-40DD-AFC4-6F175D3DCCD1}">
+            <a:ext uri="{909E8E84-426E-40dd-AFC4-6F175D3DCCD1}">
               <a14:hiddenFill xmlns:a14="http://schemas.microsoft.com/office/drawing/2010/main">
                 <a:solidFill>
                   <a:schemeClr val="accent1"/>
                 </a:solidFill>
               </a14:hiddenFill>
             </a:ext>
-            <a:ext uri="{91240B29-F687-4F45-9708-019B960494DF}">
+            <a:ext uri="{91240B29-F687-4f45-9708-019B960494DF}">
               <a14:hiddenLine xmlns:a14="http://schemas.microsoft.com/office/drawing/2010/main" w="12700" cap="sq">
                 <a:solidFill>
                   <a:schemeClr val="tx1"/>
@@ -438,7 +438,7 @@
                 <a:tailEnd type="none" w="sm" len="sm"/>
               </a14:hiddenLine>
             </a:ext>
-            <a:ext uri="{AF507438-7753-43E0-B8FC-AC1667EBCBE1}">
+            <a:ext uri="{AF507438-7753-43e0-B8FC-AC1667EBCBE1}">
               <a14:hiddenEffects xmlns:a14="http://schemas.microsoft.com/office/drawing/2010/main">
                 <a:effectLst>
                   <a:outerShdw dist="35921" dir="2700000" algn="ctr" rotWithShape="0">
@@ -464,7 +464,7 @@
             <a:fld id="{4B428B36-C543-42D9-BBA6-37F84FDFF3D3}" type="slidenum">
               <a:rPr lang="en-US"/>
               <a:pPr/>
-              <a:t>‹N°›</a:t>
+              <a:t>‹#›</a:t>
             </a:fld>
             <a:endParaRPr lang="en-US"/>
           </a:p>
@@ -529,14 +529,14 @@
             <a:noFill/>
           </a:ln>
           <a:extLst>
-            <a:ext uri="{909E8E84-426E-40DD-AFC4-6F175D3DCCD1}">
+            <a:ext uri="{909E8E84-426E-40dd-AFC4-6F175D3DCCD1}">
               <a14:hiddenFill xmlns:a14="http://schemas.microsoft.com/office/drawing/2010/main">
                 <a:solidFill>
                   <a:schemeClr val="accent1"/>
                 </a:solidFill>
               </a14:hiddenFill>
             </a:ext>
-            <a:ext uri="{91240B29-F687-4F45-9708-019B960494DF}">
+            <a:ext uri="{91240B29-F687-4f45-9708-019B960494DF}">
               <a14:hiddenLine xmlns:a14="http://schemas.microsoft.com/office/drawing/2010/main" w="12700" cap="sq">
                 <a:solidFill>
                   <a:schemeClr val="tx1"/>
@@ -616,14 +616,14 @@
             <a:noFill/>
           </a:ln>
           <a:extLst>
-            <a:ext uri="{909E8E84-426E-40DD-AFC4-6F175D3DCCD1}">
+            <a:ext uri="{909E8E84-426E-40dd-AFC4-6F175D3DCCD1}">
               <a14:hiddenFill xmlns:a14="http://schemas.microsoft.com/office/drawing/2010/main">
                 <a:solidFill>
                   <a:schemeClr val="accent1"/>
                 </a:solidFill>
               </a14:hiddenFill>
             </a:ext>
-            <a:ext uri="{91240B29-F687-4F45-9708-019B960494DF}">
+            <a:ext uri="{91240B29-F687-4f45-9708-019B960494DF}">
               <a14:hiddenLine xmlns:a14="http://schemas.microsoft.com/office/drawing/2010/main" w="12700" cap="sq">
                 <a:solidFill>
                   <a:schemeClr val="tx1"/>
@@ -702,14 +702,14 @@
             <a:noFill/>
           </a:ln>
           <a:extLst>
-            <a:ext uri="{909E8E84-426E-40DD-AFC4-6F175D3DCCD1}">
+            <a:ext uri="{909E8E84-426E-40dd-AFC4-6F175D3DCCD1}">
               <a14:hiddenFill xmlns:a14="http://schemas.microsoft.com/office/drawing/2010/main">
                 <a:solidFill>
                   <a:schemeClr val="accent1"/>
                 </a:solidFill>
               </a14:hiddenFill>
             </a:ext>
-            <a:ext uri="{91240B29-F687-4F45-9708-019B960494DF}">
+            <a:ext uri="{91240B29-F687-4f45-9708-019B960494DF}">
               <a14:hiddenLine xmlns:a14="http://schemas.microsoft.com/office/drawing/2010/main" w="12700" cap="sq">
                 <a:solidFill>
                   <a:schemeClr val="tx1"/>
@@ -760,14 +760,14 @@
             <a:noFill/>
           </a:ln>
           <a:extLst>
-            <a:ext uri="{909E8E84-426E-40DD-AFC4-6F175D3DCCD1}">
+            <a:ext uri="{909E8E84-426E-40dd-AFC4-6F175D3DCCD1}">
               <a14:hiddenFill xmlns:a14="http://schemas.microsoft.com/office/drawing/2010/main">
                 <a:solidFill>
                   <a:schemeClr val="accent1"/>
                 </a:solidFill>
               </a14:hiddenFill>
             </a:ext>
-            <a:ext uri="{91240B29-F687-4F45-9708-019B960494DF}">
+            <a:ext uri="{91240B29-F687-4f45-9708-019B960494DF}">
               <a14:hiddenLine xmlns:a14="http://schemas.microsoft.com/office/drawing/2010/main" w="12700" cap="sq">
                 <a:solidFill>
                   <a:schemeClr val="tx1"/>
@@ -818,14 +818,14 @@
             <a:noFill/>
           </a:ln>
           <a:extLst>
-            <a:ext uri="{909E8E84-426E-40DD-AFC4-6F175D3DCCD1}">
+            <a:ext uri="{909E8E84-426E-40dd-AFC4-6F175D3DCCD1}">
               <a14:hiddenFill xmlns:a14="http://schemas.microsoft.com/office/drawing/2010/main">
                 <a:solidFill>
                   <a:schemeClr val="accent1"/>
                 </a:solidFill>
               </a14:hiddenFill>
             </a:ext>
-            <a:ext uri="{91240B29-F687-4F45-9708-019B960494DF}">
+            <a:ext uri="{91240B29-F687-4f45-9708-019B960494DF}">
               <a14:hiddenLine xmlns:a14="http://schemas.microsoft.com/office/drawing/2010/main" w="12700" cap="sq">
                 <a:solidFill>
                   <a:schemeClr val="tx1"/>
@@ -852,7 +852,7 @@
             <a:fld id="{BD037DA4-2CD6-4F4C-9028-0512D97B2D72}" type="slidenum">
               <a:rPr lang="en-US"/>
               <a:pPr/>
-              <a:t>‹N°›</a:t>
+              <a:t>‹#›</a:t>
             </a:fld>
             <a:endParaRPr lang="en-US"/>
           </a:p>
@@ -1147,7 +1147,7 @@
             <a:fld id="{44C49CC9-731A-4B50-BDC0-650767BC6B93}" type="slidenum">
               <a:rPr lang="en-US"/>
               <a:pPr/>
-              <a:t>‹N°›</a:t>
+              <a:t>‹#›</a:t>
             </a:fld>
             <a:endParaRPr lang="en-US"/>
           </a:p>
@@ -1321,7 +1321,7 @@
             <a:fld id="{7DE8DF55-8925-4897-94A2-F3B160803136}" type="slidenum">
               <a:rPr lang="en-US"/>
               <a:pPr/>
-              <a:t>‹N°›</a:t>
+              <a:t>‹#›</a:t>
             </a:fld>
             <a:endParaRPr lang="en-US"/>
           </a:p>
@@ -1510,7 +1510,7 @@
             <a:fld id="{9D3CC660-76E2-4892-BEA7-342DC714E73F}" type="slidenum">
               <a:rPr lang="en-US"/>
               <a:pPr/>
-              <a:t>‹N°›</a:t>
+              <a:t>‹#›</a:t>
             </a:fld>
             <a:endParaRPr lang="en-US"/>
           </a:p>
@@ -1689,7 +1689,7 @@
             <a:fld id="{E6519293-D77A-4508-B13B-413E2935BF6F}" type="slidenum">
               <a:rPr lang="en-US"/>
               <a:pPr/>
-              <a:t>‹N°›</a:t>
+              <a:t>‹#›</a:t>
             </a:fld>
             <a:endParaRPr lang="en-US"/>
           </a:p>
@@ -1890,7 +1890,7 @@
             <a:fld id="{F28C84F1-2906-41DC-87CE-BBD85C957CEA}" type="slidenum">
               <a:rPr lang="en-US"/>
               <a:pPr/>
-              <a:t>‹N°›</a:t>
+              <a:t>‹#›</a:t>
             </a:fld>
             <a:endParaRPr lang="en-US"/>
           </a:p>
@@ -2187,7 +2187,7 @@
             <a:fld id="{94BA1F5B-C84C-4C05-9C4A-EEB972CEFF9E}" type="slidenum">
               <a:rPr lang="en-US"/>
               <a:pPr/>
-              <a:t>‹N°›</a:t>
+              <a:t>‹#›</a:t>
             </a:fld>
             <a:endParaRPr lang="en-US"/>
           </a:p>
@@ -2623,7 +2623,7 @@
             <a:fld id="{B38B1162-7B1C-48F4-9B38-A728E2962514}" type="slidenum">
               <a:rPr lang="en-US"/>
               <a:pPr/>
-              <a:t>‹N°›</a:t>
+              <a:t>‹#›</a:t>
             </a:fld>
             <a:endParaRPr lang="en-US"/>
           </a:p>
@@ -2750,7 +2750,7 @@
             <a:fld id="{63CBABED-E1B1-4708-8347-F0AFBF884A58}" type="slidenum">
               <a:rPr lang="en-US"/>
               <a:pPr/>
-              <a:t>‹N°›</a:t>
+              <a:t>‹#›</a:t>
             </a:fld>
             <a:endParaRPr lang="en-US"/>
           </a:p>
@@ -2854,7 +2854,7 @@
             <a:fld id="{CDD132B8-5307-4975-BBA4-A959BE328673}" type="slidenum">
               <a:rPr lang="en-US"/>
               <a:pPr/>
-              <a:t>‹N°›</a:t>
+              <a:t>‹#›</a:t>
             </a:fld>
             <a:endParaRPr lang="en-US"/>
           </a:p>
@@ -3140,7 +3140,7 @@
             <a:fld id="{9B6A9862-C00F-4E88-BDC1-9F667676BE86}" type="slidenum">
               <a:rPr lang="en-US"/>
               <a:pPr/>
-              <a:t>‹N°›</a:t>
+              <a:t>‹#›</a:t>
             </a:fld>
             <a:endParaRPr lang="en-US"/>
           </a:p>
@@ -3406,7 +3406,7 @@
             <a:fld id="{B2F01F83-8EF5-41C8-95A7-32D8C428004C}" type="slidenum">
               <a:rPr lang="en-US"/>
               <a:pPr/>
-              <a:t>‹N°›</a:t>
+              <a:t>‹#›</a:t>
             </a:fld>
             <a:endParaRPr lang="en-US"/>
           </a:p>
@@ -3477,14 +3477,14 @@
             <a:noFill/>
           </a:ln>
           <a:extLst>
-            <a:ext uri="{909E8E84-426E-40DD-AFC4-6F175D3DCCD1}">
+            <a:ext uri="{909E8E84-426E-40dd-AFC4-6F175D3DCCD1}">
               <a14:hiddenFill xmlns:a14="http://schemas.microsoft.com/office/drawing/2010/main">
                 <a:solidFill>
                   <a:schemeClr val="accent1"/>
                 </a:solidFill>
               </a14:hiddenFill>
             </a:ext>
-            <a:ext uri="{91240B29-F687-4F45-9708-019B960494DF}">
+            <a:ext uri="{91240B29-F687-4f45-9708-019B960494DF}">
               <a14:hiddenLine xmlns:a14="http://schemas.microsoft.com/office/drawing/2010/main" w="9525">
                 <a:solidFill>
                   <a:schemeClr val="tx1"/>
@@ -3535,14 +3535,14 @@
             <a:noFill/>
           </a:ln>
           <a:extLst>
-            <a:ext uri="{909E8E84-426E-40DD-AFC4-6F175D3DCCD1}">
+            <a:ext uri="{909E8E84-426E-40dd-AFC4-6F175D3DCCD1}">
               <a14:hiddenFill xmlns:a14="http://schemas.microsoft.com/office/drawing/2010/main">
                 <a:solidFill>
                   <a:schemeClr val="accent1"/>
                 </a:solidFill>
               </a14:hiddenFill>
             </a:ext>
-            <a:ext uri="{91240B29-F687-4F45-9708-019B960494DF}">
+            <a:ext uri="{91240B29-F687-4f45-9708-019B960494DF}">
               <a14:hiddenLine xmlns:a14="http://schemas.microsoft.com/office/drawing/2010/main" w="9525">
                 <a:solidFill>
                   <a:schemeClr val="tx1"/>
@@ -3621,14 +3621,14 @@
             <a:noFill/>
           </a:ln>
           <a:extLst>
-            <a:ext uri="{909E8E84-426E-40DD-AFC4-6F175D3DCCD1}">
+            <a:ext uri="{909E8E84-426E-40dd-AFC4-6F175D3DCCD1}">
               <a14:hiddenFill xmlns:a14="http://schemas.microsoft.com/office/drawing/2010/main">
                 <a:solidFill>
                   <a:schemeClr val="accent1"/>
                 </a:solidFill>
               </a14:hiddenFill>
             </a:ext>
-            <a:ext uri="{91240B29-F687-4F45-9708-019B960494DF}">
+            <a:ext uri="{91240B29-F687-4f45-9708-019B960494DF}">
               <a14:hiddenLine xmlns:a14="http://schemas.microsoft.com/office/drawing/2010/main" w="9525">
                 <a:solidFill>
                   <a:schemeClr val="tx1"/>
@@ -3681,14 +3681,14 @@
             <a:noFill/>
           </a:ln>
           <a:extLst>
-            <a:ext uri="{909E8E84-426E-40DD-AFC4-6F175D3DCCD1}">
+            <a:ext uri="{909E8E84-426E-40dd-AFC4-6F175D3DCCD1}">
               <a14:hiddenFill xmlns:a14="http://schemas.microsoft.com/office/drawing/2010/main">
                 <a:solidFill>
                   <a:schemeClr val="accent1"/>
                 </a:solidFill>
               </a14:hiddenFill>
             </a:ext>
-            <a:ext uri="{91240B29-F687-4F45-9708-019B960494DF}">
+            <a:ext uri="{91240B29-F687-4f45-9708-019B960494DF}">
               <a14:hiddenLine xmlns:a14="http://schemas.microsoft.com/office/drawing/2010/main" w="9525">
                 <a:solidFill>
                   <a:schemeClr val="tx1"/>
@@ -3741,14 +3741,14 @@
             <a:noFill/>
           </a:ln>
           <a:extLst>
-            <a:ext uri="{909E8E84-426E-40DD-AFC4-6F175D3DCCD1}">
+            <a:ext uri="{909E8E84-426E-40dd-AFC4-6F175D3DCCD1}">
               <a14:hiddenFill xmlns:a14="http://schemas.microsoft.com/office/drawing/2010/main">
                 <a:solidFill>
                   <a:schemeClr val="accent1"/>
                 </a:solidFill>
               </a14:hiddenFill>
             </a:ext>
-            <a:ext uri="{91240B29-F687-4F45-9708-019B960494DF}">
+            <a:ext uri="{91240B29-F687-4f45-9708-019B960494DF}">
               <a14:hiddenLine xmlns:a14="http://schemas.microsoft.com/office/drawing/2010/main" w="9525">
                 <a:solidFill>
                   <a:schemeClr val="tx1"/>
@@ -3777,7 +3777,7 @@
             <a:fld id="{1438AF4A-0EA4-419B-A3A6-81B7546F7C08}" type="slidenum">
               <a:rPr lang="en-US"/>
               <a:pPr/>
-              <a:t>‹N°›</a:t>
+              <a:t>‹#›</a:t>
             </a:fld>
             <a:endParaRPr lang="en-US"/>
           </a:p>
@@ -4318,7 +4318,7 @@
           <p:cNvPr id="3" name="Espace réservé du contenu 2">
             <a:extLst>
               <a:ext uri="{FF2B5EF4-FFF2-40B4-BE49-F238E27FC236}">
-                <a16:creationId xmlns:a16="http://schemas.microsoft.com/office/drawing/2014/main" id="{64B9D26E-4A04-4CD3-8D65-59D2C38CE5B4}"/>
+                <a16:creationId xmlns="" xmlns:a16="http://schemas.microsoft.com/office/drawing/2014/main" id="{64B9D26E-4A04-4CD3-8D65-59D2C38CE5B4}"/>
               </a:ext>
             </a:extLst>
           </p:cNvPr>
@@ -4463,20 +4463,20 @@
           <a:p>
             <a:pPr lvl="1"/>
             <a:r>
-              <a:rPr lang="fr-CH" sz="1600" dirty="0"/>
-              <a:t>Avance</a:t>
+              <a:rPr lang="en-US" sz="1600" dirty="0" smtClean="0"/>
+              <a:t>V</a:t>
+            </a:r>
+            <a:r>
+              <a:rPr lang="fr-CH" sz="1600" dirty="0" smtClean="0"/>
+              <a:t>itesse variable</a:t>
+            </a:r>
+            <a:r>
+              <a:rPr lang="en-US" sz="1600" dirty="0" smtClean="0"/>
+              <a:t>, zoom, </a:t>
             </a:r>
             <a:r>
               <a:rPr lang="en-US" sz="1600" dirty="0"/>
-              <a:t> rapide, retour </a:t>
-            </a:r>
-            <a:r>
-              <a:rPr lang="fr-CH" sz="1600" dirty="0"/>
-              <a:t>rapide</a:t>
-            </a:r>
-            <a:r>
-              <a:rPr lang="en-US" sz="1600" dirty="0"/>
-              <a:t>, lecture </a:t>
+              <a:t>lecture </a:t>
             </a:r>
             <a:r>
               <a:rPr lang="fr-CH" sz="1600" dirty="0"/>
@@ -4560,40 +4560,76 @@
               <a:t> </a:t>
             </a:r>
             <a:r>
-              <a:rPr lang="en-US" dirty="0" err="1"/>
-              <a:t>d’une</a:t>
+              <a:rPr lang="en-US" dirty="0" smtClean="0"/>
+              <a:t>d’un </a:t>
+            </a:r>
+            <a:r>
+              <a:rPr lang="en-US" dirty="0" err="1" smtClean="0"/>
+              <a:t>fichier</a:t>
+            </a:r>
+            <a:r>
+              <a:rPr lang="en-US" dirty="0" smtClean="0"/>
+              <a:t> XML pour </a:t>
             </a:r>
             <a:r>
               <a:rPr lang="en-US" dirty="0"/>
+              <a:t>stocker </a:t>
+            </a:r>
+            <a:r>
+              <a:rPr lang="en-US" dirty="0" smtClean="0"/>
+              <a:t>les </a:t>
+            </a:r>
+            <a:r>
+              <a:rPr lang="en-US" dirty="0" err="1" smtClean="0"/>
+              <a:t>informations</a:t>
+            </a:r>
+            <a:r>
+              <a:rPr lang="en-US" dirty="0" smtClean="0"/>
               <a:t> </a:t>
             </a:r>
             <a:r>
-              <a:rPr lang="en-US" dirty="0" err="1"/>
-              <a:t>bibliotheque</a:t>
+              <a:rPr lang="en-US" dirty="0" err="1" smtClean="0"/>
+              <a:t>sur</a:t>
+            </a:r>
+            <a:r>
+              <a:rPr lang="en-US" dirty="0" smtClean="0"/>
+              <a:t> les </a:t>
+            </a:r>
+            <a:r>
+              <a:rPr lang="en-US" dirty="0" err="1" smtClean="0"/>
+              <a:t>musiques</a:t>
             </a:r>
             <a:r>
               <a:rPr lang="en-US" dirty="0"/>
-              <a:t> pour stocker les </a:t>
-            </a:r>
-            <a:r>
-              <a:rPr lang="en-US" dirty="0" err="1"/>
-              <a:t>musiques</a:t>
+              <a:t>,</a:t>
+            </a:r>
+            <a:r>
+              <a:rPr lang="en-US" dirty="0" smtClean="0"/>
+              <a:t> </a:t>
             </a:r>
             <a:r>
               <a:rPr lang="en-US" dirty="0"/>
-              <a:t> et les </a:t>
-            </a:r>
-            <a:r>
-              <a:rPr lang="en-US" dirty="0" err="1"/>
+              <a:t>les </a:t>
+            </a:r>
+            <a:r>
+              <a:rPr lang="en-US" dirty="0" err="1" smtClean="0"/>
               <a:t>vidéos</a:t>
             </a:r>
             <a:r>
+              <a:rPr lang="en-US" dirty="0" smtClean="0"/>
+              <a:t> et les playlists </a:t>
+            </a:r>
+            <a:r>
               <a:rPr lang="en-US" dirty="0"/>
-              <a:t> de </a:t>
-            </a:r>
-            <a:r>
-              <a:rPr lang="en-US" dirty="0" err="1"/>
+              <a:t>de </a:t>
+            </a:r>
+            <a:r>
+              <a:rPr lang="en-US" dirty="0" err="1" smtClean="0"/>
               <a:t>l’utilisateur</a:t>
+            </a:r>
+            <a:r>
+              <a:rPr lang="en-US" dirty="0" smtClean="0"/>
+              <a:t>.</a:t>
             </a:r>
             <a:endParaRPr lang="en-US" dirty="0"/>
           </a:p>
@@ -4674,12 +4710,8 @@
               <a:t>Technologies et </a:t>
             </a:r>
             <a:r>
-              <a:rPr lang="en-US" dirty="0" err="1"/>
-              <a:t>langages</a:t>
-            </a:r>
-            <a:r>
-              <a:rPr lang="en-US" dirty="0"/>
-              <a:t> </a:t>
+              <a:rPr lang="en-US" dirty="0" smtClean="0"/>
+              <a:t>languages </a:t>
             </a:r>
             <a:r>
               <a:rPr lang="en-US" dirty="0" err="1"/>
@@ -4720,8 +4752,12 @@
               <a:t> : </a:t>
             </a:r>
             <a:r>
+              <a:rPr lang="en-US" sz="1700" dirty="0" smtClean="0"/>
+              <a:t>Déjà </a:t>
+            </a:r>
+            <a:r>
               <a:rPr lang="en-US" sz="1700" dirty="0" err="1"/>
-              <a:t>Déja</a:t>
+              <a:t>installé</a:t>
             </a:r>
             <a:r>
               <a:rPr lang="en-US" sz="1700" dirty="0"/>
@@ -4729,14 +4765,6 @@
             </a:r>
             <a:r>
               <a:rPr lang="en-US" sz="1700" dirty="0" err="1"/>
-              <a:t>installé</a:t>
-            </a:r>
-            <a:r>
-              <a:rPr lang="en-US" sz="1700" dirty="0"/>
-              <a:t> </a:t>
-            </a:r>
-            <a:r>
-              <a:rPr lang="en-US" sz="1700" dirty="0" err="1"/>
               <a:t>nativement</a:t>
             </a:r>
             <a:r>
@@ -4776,16 +4804,20 @@
               <a:t>, </a:t>
             </a:r>
             <a:r>
-              <a:rPr lang="en-US" sz="1700" dirty="0" err="1"/>
-              <a:t>supporte</a:t>
+              <a:rPr lang="en-US" sz="1700" dirty="0" smtClean="0"/>
+              <a:t>support </a:t>
             </a:r>
             <a:r>
               <a:rPr lang="en-US" sz="1700" dirty="0"/>
-              <a:t> des formats </a:t>
-            </a:r>
-            <a:r>
-              <a:rPr lang="en-US" sz="1700" dirty="0" err="1"/>
+              <a:t>des formats </a:t>
+            </a:r>
+            <a:r>
+              <a:rPr lang="en-US" sz="1700" dirty="0" err="1" smtClean="0"/>
               <a:t>récents</a:t>
+            </a:r>
+            <a:r>
+              <a:rPr lang="en-US" sz="1700" dirty="0" smtClean="0"/>
+              <a:t>.</a:t>
             </a:r>
             <a:endParaRPr lang="en-US" sz="1700" dirty="0"/>
           </a:p>
@@ -4929,28 +4961,123 @@
           <a:p>
             <a:pPr lvl="1"/>
             <a:r>
+              <a:rPr lang="en-US" sz="1700" dirty="0" err="1" smtClean="0"/>
+              <a:t>Avantages</a:t>
+            </a:r>
+            <a:r>
+              <a:rPr lang="en-US" sz="1700" dirty="0" smtClean="0"/>
+              <a:t> </a:t>
+            </a:r>
+            <a:r>
+              <a:rPr lang="en-US" sz="1700" dirty="0"/>
+              <a:t>: Rapide </a:t>
+            </a:r>
+            <a:r>
+              <a:rPr lang="en-US" sz="1700" dirty="0" err="1"/>
+              <a:t>d’accès</a:t>
+            </a:r>
+            <a:r>
+              <a:rPr lang="en-US" sz="1700" dirty="0"/>
+              <a:t>, </a:t>
+            </a:r>
+            <a:r>
+              <a:rPr lang="en-US" sz="1700" dirty="0" smtClean="0"/>
+              <a:t>simple </a:t>
+            </a:r>
+            <a:r>
+              <a:rPr lang="en-US" sz="1700" dirty="0" err="1" smtClean="0"/>
+              <a:t>à</a:t>
+            </a:r>
+            <a:r>
+              <a:rPr lang="en-US" sz="1700" dirty="0" smtClean="0"/>
+              <a:t> </a:t>
+            </a:r>
+            <a:r>
+              <a:rPr lang="en-US" sz="1700" dirty="0" err="1" smtClean="0"/>
+              <a:t>utiliser</a:t>
+            </a:r>
+            <a:r>
+              <a:rPr lang="en-US" sz="1700" dirty="0" smtClean="0"/>
+              <a:t> </a:t>
+            </a:r>
+            <a:r>
+              <a:rPr lang="en-US" sz="1700" dirty="0"/>
+              <a:t>pour </a:t>
+            </a:r>
+            <a:r>
+              <a:rPr lang="en-US" sz="1700" dirty="0" err="1"/>
+              <a:t>maintenir</a:t>
+            </a:r>
+            <a:r>
+              <a:rPr lang="en-US" sz="1700" dirty="0"/>
+              <a:t> la </a:t>
+            </a:r>
+            <a:r>
+              <a:rPr lang="en-US" sz="1700" dirty="0" err="1" smtClean="0"/>
+              <a:t>bibliothèque</a:t>
+            </a:r>
+            <a:r>
+              <a:rPr lang="en-US" sz="1700" dirty="0"/>
+              <a:t>, </a:t>
+            </a:r>
+            <a:r>
+              <a:rPr lang="en-US" sz="1700" dirty="0" smtClean="0"/>
+              <a:t>vu </a:t>
+            </a:r>
+            <a:r>
+              <a:rPr lang="en-US" sz="1700" dirty="0" err="1"/>
+              <a:t>dans</a:t>
+            </a:r>
+            <a:r>
+              <a:rPr lang="en-US" sz="1700" dirty="0"/>
+              <a:t> le cadre du </a:t>
+            </a:r>
+            <a:r>
+              <a:rPr lang="en-US" sz="1700" dirty="0" err="1"/>
+              <a:t>cours</a:t>
+            </a:r>
+            <a:r>
+              <a:rPr lang="en-US" sz="1700" dirty="0"/>
+              <a:t> SER.</a:t>
+            </a:r>
+          </a:p>
+          <a:p>
+            <a:pPr lvl="1"/>
+            <a:r>
+              <a:rPr lang="en-US" sz="1700" dirty="0" err="1"/>
+              <a:t>Inconvénients</a:t>
+            </a:r>
+            <a:r>
+              <a:rPr lang="en-US" sz="1700" dirty="0"/>
+              <a:t> : Ne </a:t>
+            </a:r>
+            <a:r>
+              <a:rPr lang="en-US" sz="1700" dirty="0" err="1"/>
+              <a:t>permet</a:t>
+            </a:r>
+            <a:r>
+              <a:rPr lang="en-US" sz="1700" dirty="0"/>
+              <a:t> pas de </a:t>
+            </a:r>
+            <a:r>
+              <a:rPr lang="en-US" sz="1700" dirty="0" err="1"/>
+              <a:t>personnaliser</a:t>
+            </a:r>
+            <a:r>
+              <a:rPr lang="en-US" sz="1700" dirty="0"/>
+              <a:t> le </a:t>
+            </a:r>
+            <a:r>
+              <a:rPr lang="en-US" sz="1700" dirty="0" err="1"/>
+              <a:t>lecteur</a:t>
+            </a:r>
+            <a:r>
               <a:rPr lang="en-US" sz="1700" dirty="0"/>
               <a:t> </a:t>
             </a:r>
             <a:r>
               <a:rPr lang="en-US" sz="1700" dirty="0" err="1"/>
-              <a:t>Avantages</a:t>
-            </a:r>
-            <a:r>
-              <a:rPr lang="en-US" sz="1700" dirty="0"/>
-              <a:t> : Rapide </a:t>
-            </a:r>
-            <a:r>
-              <a:rPr lang="en-US" sz="1700" dirty="0" err="1"/>
-              <a:t>d’accès</a:t>
-            </a:r>
-            <a:r>
-              <a:rPr lang="en-US" sz="1700" dirty="0"/>
-              <a:t>, </a:t>
-            </a:r>
-            <a:r>
-              <a:rPr lang="en-US" sz="1700" dirty="0" err="1"/>
-              <a:t>simplicité</a:t>
+              <a:t>comme</a:t>
             </a:r>
             <a:r>
               <a:rPr lang="en-US" sz="1700" dirty="0"/>
@@ -4958,31 +5085,7 @@
             </a:r>
             <a:r>
               <a:rPr lang="en-US" sz="1700" dirty="0" err="1"/>
-              <a:t>d’utilisation</a:t>
-            </a:r>
-            <a:r>
-              <a:rPr lang="en-US" sz="1700" dirty="0"/>
-              <a:t> et pour </a:t>
-            </a:r>
-            <a:r>
-              <a:rPr lang="en-US" sz="1700" dirty="0" err="1"/>
-              <a:t>maintenir</a:t>
-            </a:r>
-            <a:r>
-              <a:rPr lang="en-US" sz="1700" dirty="0"/>
-              <a:t> la </a:t>
-            </a:r>
-            <a:r>
-              <a:rPr lang="en-US" sz="1700" dirty="0" err="1"/>
-              <a:t>bibliotheque</a:t>
-            </a:r>
-            <a:r>
-              <a:rPr lang="en-US" sz="1700" dirty="0"/>
-              <a:t>, </a:t>
-            </a:r>
-            <a:r>
-              <a:rPr lang="en-US" sz="1700" dirty="0" err="1"/>
-              <a:t>vue</a:t>
+              <a:t>l’idée</a:t>
             </a:r>
             <a:r>
               <a:rPr lang="en-US" sz="1700" dirty="0"/>
@@ -4990,86 +5093,27 @@
             </a:r>
             <a:r>
               <a:rPr lang="en-US" sz="1700" dirty="0" err="1"/>
-              <a:t>dans</a:t>
+              <a:t>é</a:t>
+            </a:r>
+            <a:r>
+              <a:rPr lang="en-US" sz="1700" dirty="0" err="1" smtClean="0"/>
+              <a:t>tait</a:t>
+            </a:r>
+            <a:r>
+              <a:rPr lang="en-US" sz="1700" dirty="0" smtClean="0"/>
+              <a:t> </a:t>
+            </a:r>
+            <a:r>
+              <a:rPr lang="en-US" sz="1700" dirty="0" err="1" smtClean="0"/>
+              <a:t>suggérée</a:t>
+            </a:r>
+            <a:r>
+              <a:rPr lang="en-US" sz="1700" dirty="0" smtClean="0"/>
+              <a:t> </a:t>
             </a:r>
             <a:r>
               <a:rPr lang="en-US" sz="1700" dirty="0"/>
-              <a:t> le cadre du </a:t>
-            </a:r>
-            <a:r>
-              <a:rPr lang="en-US" sz="1700" dirty="0" err="1"/>
-              <a:t>cours</a:t>
-            </a:r>
-            <a:r>
-              <a:rPr lang="en-US" sz="1700" dirty="0"/>
-              <a:t> SER.</a:t>
-            </a:r>
-          </a:p>
-          <a:p>
-            <a:pPr lvl="1"/>
-            <a:r>
-              <a:rPr lang="en-US" sz="1700" dirty="0" err="1"/>
-              <a:t>Inconvénients</a:t>
-            </a:r>
-            <a:r>
-              <a:rPr lang="en-US" sz="1700" dirty="0"/>
-              <a:t> : Ne </a:t>
-            </a:r>
-            <a:r>
-              <a:rPr lang="en-US" sz="1700" dirty="0" err="1"/>
-              <a:t>permet</a:t>
-            </a:r>
-            <a:r>
-              <a:rPr lang="en-US" sz="1700" dirty="0"/>
-              <a:t> pas de </a:t>
-            </a:r>
-            <a:r>
-              <a:rPr lang="en-US" sz="1700" dirty="0" err="1"/>
-              <a:t>personnaliser</a:t>
-            </a:r>
-            <a:r>
-              <a:rPr lang="en-US" sz="1700" dirty="0"/>
-              <a:t> le </a:t>
-            </a:r>
-            <a:r>
-              <a:rPr lang="en-US" sz="1700" dirty="0" err="1"/>
-              <a:t>lecteur</a:t>
-            </a:r>
-            <a:r>
-              <a:rPr lang="en-US" sz="1700" dirty="0"/>
-              <a:t> </a:t>
-            </a:r>
-            <a:r>
-              <a:rPr lang="en-US" sz="1700" dirty="0" err="1"/>
-              <a:t>comme</a:t>
-            </a:r>
-            <a:r>
-              <a:rPr lang="en-US" sz="1700" dirty="0"/>
-              <a:t> </a:t>
-            </a:r>
-            <a:r>
-              <a:rPr lang="en-US" sz="1700" dirty="0" err="1"/>
-              <a:t>l’idée</a:t>
-            </a:r>
-            <a:r>
-              <a:rPr lang="en-US" sz="1700" dirty="0"/>
-              <a:t> </a:t>
-            </a:r>
-            <a:r>
-              <a:rPr lang="en-US" sz="1700" dirty="0" err="1"/>
-              <a:t>etait</a:t>
-            </a:r>
-            <a:r>
-              <a:rPr lang="en-US" sz="1700" dirty="0"/>
-              <a:t> </a:t>
-            </a:r>
-            <a:r>
-              <a:rPr lang="en-US" sz="1700" dirty="0" err="1"/>
-              <a:t>suggérer</a:t>
-            </a:r>
-            <a:r>
-              <a:rPr lang="en-US" sz="1700" dirty="0"/>
-              <a:t> au début du </a:t>
+              <a:t>au début du </a:t>
             </a:r>
             <a:r>
               <a:rPr lang="en-US" sz="1700" dirty="0" err="1"/>
@@ -5311,14 +5355,14 @@
           </a:ln>
           <a:effectLst/>
           <a:extLst>
-            <a:ext uri="{909E8E84-426E-40DD-AFC4-6F175D3DCCD1}">
+            <a:ext uri="{909E8E84-426E-40dd-AFC4-6F175D3DCCD1}">
               <a14:hiddenFill xmlns:a14="http://schemas.microsoft.com/office/drawing/2010/main">
                 <a:solidFill>
                   <a:schemeClr val="accent1"/>
                 </a:solidFill>
               </a14:hiddenFill>
             </a:ext>
-            <a:ext uri="{91240B29-F687-4F45-9708-019B960494DF}">
+            <a:ext uri="{91240B29-F687-4f45-9708-019B960494DF}">
               <a14:hiddenLine xmlns:a14="http://schemas.microsoft.com/office/drawing/2010/main" w="12700" cap="sq">
                 <a:solidFill>
                   <a:schemeClr val="tx1"/>
@@ -5328,7 +5372,7 @@
                 <a:tailEnd type="none" w="sm" len="sm"/>
               </a14:hiddenLine>
             </a:ext>
-            <a:ext uri="{AF507438-7753-43E0-B8FC-AC1667EBCBE1}">
+            <a:ext uri="{AF507438-7753-43e0-B8FC-AC1667EBCBE1}">
               <a14:hiddenEffects xmlns:a14="http://schemas.microsoft.com/office/drawing/2010/main">
                 <a:effectLst>
                   <a:outerShdw dist="35921" dir="2700000" algn="ctr" rotWithShape="0">
@@ -5474,15 +5518,19 @@
               <a:t> pas </a:t>
             </a:r>
             <a:r>
-              <a:rPr lang="en-US" sz="1600" dirty="0" err="1"/>
-              <a:t>commencé</a:t>
+              <a:rPr lang="en-US" sz="1600" dirty="0" err="1" smtClean="0"/>
+              <a:t>commencée</a:t>
             </a:r>
             <a:endParaRPr lang="en-US" sz="1600" dirty="0"/>
           </a:p>
           <a:p>
             <a:r>
+              <a:rPr lang="en-US" dirty="0" smtClean="0"/>
+              <a:t>Causes </a:t>
+            </a:r>
+            <a:r>
               <a:rPr lang="en-US" dirty="0"/>
-              <a:t>Cause :</a:t>
+              <a:t>:</a:t>
             </a:r>
           </a:p>
           <a:p>
@@ -5501,7 +5549,19 @@
             </a:r>
             <a:r>
               <a:rPr lang="en-US" sz="1600" dirty="0"/>
-              <a:t> au depart du </a:t>
+              <a:t> au </a:t>
+            </a:r>
+            <a:r>
+              <a:rPr lang="en-US" sz="1600" dirty="0" err="1" smtClean="0"/>
+              <a:t>départ</a:t>
+            </a:r>
+            <a:r>
+              <a:rPr lang="en-US" sz="1600" dirty="0" smtClean="0"/>
+              <a:t> </a:t>
+            </a:r>
+            <a:r>
+              <a:rPr lang="en-US" sz="1600" dirty="0"/>
+              <a:t>du </a:t>
             </a:r>
             <a:r>
               <a:rPr lang="en-US" sz="1600" dirty="0" err="1"/>
@@ -5642,8 +5702,28 @@
               <a:t>, </a:t>
             </a:r>
             <a:r>
+              <a:rPr lang="en-US" sz="1600" dirty="0" err="1" smtClean="0"/>
+              <a:t>replanification</a:t>
+            </a:r>
+            <a:r>
+              <a:rPr lang="en-US" sz="1600" dirty="0" smtClean="0"/>
+              <a:t> </a:t>
+            </a:r>
+            <a:r>
+              <a:rPr lang="en-US" sz="1600" dirty="0" err="1" smtClean="0"/>
+              <a:t>effectuée</a:t>
+            </a:r>
+            <a:r>
+              <a:rPr lang="en-US" sz="1600" dirty="0" smtClean="0"/>
+              <a:t> </a:t>
+            </a:r>
+            <a:r>
+              <a:rPr lang="en-US" sz="1600" dirty="0"/>
+              <a:t>: </a:t>
+            </a:r>
+            <a:r>
               <a:rPr lang="en-US" sz="1600" dirty="0" err="1"/>
-              <a:t>replannification</a:t>
+              <a:t>nouvelles</a:t>
             </a:r>
             <a:r>
               <a:rPr lang="en-US" sz="1600" dirty="0"/>
@@ -5651,15 +5731,30 @@
             </a:r>
             <a:r>
               <a:rPr lang="en-US" sz="1600" dirty="0" err="1"/>
-              <a:t>effectués</a:t>
+              <a:t>itérations</a:t>
             </a:r>
             <a:r>
               <a:rPr lang="en-US" sz="1600" dirty="0"/>
-              <a:t> : </a:t>
+              <a:t>.</a:t>
+            </a:r>
+          </a:p>
+          <a:p>
+            <a:pPr lvl="1"/>
+            <a:r>
+              <a:rPr lang="en-US" sz="1600" dirty="0"/>
+              <a:t>Il sera possible de </a:t>
             </a:r>
             <a:r>
               <a:rPr lang="en-US" sz="1600" dirty="0" err="1"/>
-              <a:t>nouvelles</a:t>
+              <a:t>rendre</a:t>
+            </a:r>
+            <a:r>
+              <a:rPr lang="en-US" sz="1600" dirty="0"/>
+              <a:t> le </a:t>
+            </a:r>
+            <a:r>
+              <a:rPr lang="en-US" sz="1600" dirty="0" err="1"/>
+              <a:t>projet</a:t>
             </a:r>
             <a:r>
               <a:rPr lang="en-US" sz="1600" dirty="0"/>
@@ -5667,46 +5762,31 @@
             </a:r>
             <a:r>
               <a:rPr lang="en-US" sz="1600" dirty="0" err="1"/>
-              <a:t>itérations</a:t>
+              <a:t>dans</a:t>
             </a:r>
             <a:r>
               <a:rPr lang="en-US" sz="1600" dirty="0"/>
-              <a:t>.</a:t>
-            </a:r>
-          </a:p>
-          <a:p>
-            <a:pPr lvl="1"/>
-            <a:r>
-              <a:rPr lang="en-US" sz="1600" dirty="0"/>
-              <a:t>Il sera possible de </a:t>
+              <a:t> les temps sous reserve </a:t>
             </a:r>
             <a:r>
               <a:rPr lang="en-US" sz="1600" dirty="0" err="1"/>
-              <a:t>rendre</a:t>
-            </a:r>
-            <a:r>
-              <a:rPr lang="en-US" sz="1600" dirty="0"/>
-              <a:t> le </a:t>
-            </a:r>
-            <a:r>
-              <a:rPr lang="en-US" sz="1600" dirty="0" err="1"/>
-              <a:t>projet</a:t>
+              <a:t>qu’aucun</a:t>
             </a:r>
             <a:r>
               <a:rPr lang="en-US" sz="1600" dirty="0"/>
               <a:t> </a:t>
             </a:r>
             <a:r>
+              <a:rPr lang="en-US" sz="1600" dirty="0" err="1" smtClean="0"/>
+              <a:t>autre</a:t>
+            </a:r>
+            <a:r>
+              <a:rPr lang="en-US" sz="1600" dirty="0" smtClean="0"/>
+              <a:t> </a:t>
+            </a:r>
+            <a:r>
               <a:rPr lang="en-US" sz="1600" dirty="0" err="1"/>
-              <a:t>dans</a:t>
-            </a:r>
-            <a:r>
-              <a:rPr lang="en-US" sz="1600" dirty="0"/>
-              <a:t> les temps sous reserve </a:t>
-            </a:r>
-            <a:r>
-              <a:rPr lang="en-US" sz="1600" dirty="0" err="1"/>
-              <a:t>qu’aucun</a:t>
+              <a:t>problème</a:t>
             </a:r>
             <a:r>
               <a:rPr lang="en-US" sz="1600" dirty="0"/>
@@ -5714,36 +5794,21 @@
             </a:r>
             <a:r>
               <a:rPr lang="en-US" sz="1600" dirty="0" err="1"/>
-              <a:t>n’autre</a:t>
+              <a:t>majeur</a:t>
             </a:r>
             <a:r>
               <a:rPr lang="en-US" sz="1600" dirty="0"/>
               <a:t> </a:t>
             </a:r>
             <a:r>
-              <a:rPr lang="en-US" sz="1600" dirty="0" err="1"/>
-              <a:t>problème</a:t>
-            </a:r>
-            <a:r>
-              <a:rPr lang="en-US" sz="1600" dirty="0"/>
-              <a:t> </a:t>
-            </a:r>
-            <a:r>
-              <a:rPr lang="en-US" sz="1600" dirty="0" err="1"/>
-              <a:t>majeur</a:t>
-            </a:r>
-            <a:r>
-              <a:rPr lang="en-US" sz="1600" dirty="0"/>
-              <a:t> </a:t>
-            </a:r>
-            <a:r>
-              <a:rPr lang="en-US" sz="1600" dirty="0" err="1"/>
-              <a:t>n’apparaissent</a:t>
-            </a:r>
-            <a:r>
-              <a:rPr lang="en-US" sz="1600" dirty="0"/>
+              <a:rPr lang="en-US" sz="1600" dirty="0" err="1" smtClean="0"/>
+              <a:t>n’apparaisse</a:t>
+            </a:r>
+            <a:r>
+              <a:rPr lang="en-US" sz="1600" dirty="0" smtClean="0"/>
               <a:t>…</a:t>
             </a:r>
+            <a:endParaRPr lang="en-US" sz="1600" dirty="0"/>
           </a:p>
         </p:txBody>
       </p:sp>
@@ -5782,7 +5847,7 @@
           <p:cNvPr id="2" name="Titre 1">
             <a:extLst>
               <a:ext uri="{FF2B5EF4-FFF2-40B4-BE49-F238E27FC236}">
-                <a16:creationId xmlns:a16="http://schemas.microsoft.com/office/drawing/2014/main" id="{385D8F2F-B0C0-4893-B1EA-5517B6CFF217}"/>
+                <a16:creationId xmlns="" xmlns:a16="http://schemas.microsoft.com/office/drawing/2014/main" id="{385D8F2F-B0C0-4893-B1EA-5517B6CFF217}"/>
               </a:ext>
             </a:extLst>
           </p:cNvPr>
@@ -5810,7 +5875,7 @@
           <p:cNvPr id="3" name="Espace réservé du contenu 2">
             <a:extLst>
               <a:ext uri="{FF2B5EF4-FFF2-40B4-BE49-F238E27FC236}">
-                <a16:creationId xmlns:a16="http://schemas.microsoft.com/office/drawing/2014/main" id="{CB7CEF96-F08F-465A-8DEE-258E69953B64}"/>
+                <a16:creationId xmlns="" xmlns:a16="http://schemas.microsoft.com/office/drawing/2014/main" id="{CB7CEF96-F08F-465A-8DEE-258E69953B64}"/>
               </a:ext>
             </a:extLst>
           </p:cNvPr>
@@ -6095,7 +6160,7 @@
         </a:ln>
         <a:effectLst/>
         <a:extLst>
-          <a:ext uri="{AF507438-7753-43E0-B8FC-AC1667EBCBE1}">
+          <a:ext uri="{AF507438-7753-43e0-B8FC-AC1667EBCBE1}">
             <a14:hiddenEffects xmlns:a14="http://schemas.microsoft.com/office/drawing/2010/main">
               <a:effectLst>
                 <a:outerShdw dist="35921" dir="2700000" algn="ctr" rotWithShape="0">
@@ -6168,7 +6233,7 @@
         </a:ln>
         <a:effectLst/>
         <a:extLst>
-          <a:ext uri="{AF507438-7753-43E0-B8FC-AC1667EBCBE1}">
+          <a:ext uri="{AF507438-7753-43e0-B8FC-AC1667EBCBE1}">
             <a14:hiddenEffects xmlns:a14="http://schemas.microsoft.com/office/drawing/2010/main">
               <a:effectLst>
                 <a:outerShdw dist="35921" dir="2700000" algn="ctr" rotWithShape="0">

</xml_diff>